<commit_message>
small clarifications to lecture #21
</commit_message>
<xml_diff>
--- a/classes/stats2015/Lecture21.pptx
+++ b/classes/stats2015/Lecture21.pptx
@@ -317,7 +317,7 @@
             <a:fld id="{1D8BD707-D9CF-40AE-B4C6-C98DA3205C09}" type="datetimeFigureOut">
               <a:rPr lang="en-US" smtClean="0"/>
               <a:pPr/>
-              <a:t>4/17/2015</a:t>
+              <a:t>4/18/2015</a:t>
             </a:fld>
             <a:endParaRPr lang="en-US"/>
           </a:p>
@@ -484,7 +484,7 @@
             <a:fld id="{1D8BD707-D9CF-40AE-B4C6-C98DA3205C09}" type="datetimeFigureOut">
               <a:rPr lang="en-US" smtClean="0"/>
               <a:pPr/>
-              <a:t>4/17/2015</a:t>
+              <a:t>4/18/2015</a:t>
             </a:fld>
             <a:endParaRPr lang="en-US"/>
           </a:p>
@@ -661,7 +661,7 @@
             <a:fld id="{1D8BD707-D9CF-40AE-B4C6-C98DA3205C09}" type="datetimeFigureOut">
               <a:rPr lang="en-US" smtClean="0"/>
               <a:pPr/>
-              <a:t>4/17/2015</a:t>
+              <a:t>4/18/2015</a:t>
             </a:fld>
             <a:endParaRPr lang="en-US"/>
           </a:p>
@@ -828,7 +828,7 @@
             <a:fld id="{1D8BD707-D9CF-40AE-B4C6-C98DA3205C09}" type="datetimeFigureOut">
               <a:rPr lang="en-US" smtClean="0"/>
               <a:pPr/>
-              <a:t>4/17/2015</a:t>
+              <a:t>4/18/2015</a:t>
             </a:fld>
             <a:endParaRPr lang="en-US"/>
           </a:p>
@@ -1071,7 +1071,7 @@
             <a:fld id="{1D8BD707-D9CF-40AE-B4C6-C98DA3205C09}" type="datetimeFigureOut">
               <a:rPr lang="en-US" smtClean="0"/>
               <a:pPr/>
-              <a:t>4/17/2015</a:t>
+              <a:t>4/18/2015</a:t>
             </a:fld>
             <a:endParaRPr lang="en-US"/>
           </a:p>
@@ -1356,7 +1356,7 @@
             <a:fld id="{1D8BD707-D9CF-40AE-B4C6-C98DA3205C09}" type="datetimeFigureOut">
               <a:rPr lang="en-US" smtClean="0"/>
               <a:pPr/>
-              <a:t>4/17/2015</a:t>
+              <a:t>4/18/2015</a:t>
             </a:fld>
             <a:endParaRPr lang="en-US"/>
           </a:p>
@@ -1775,7 +1775,7 @@
             <a:fld id="{1D8BD707-D9CF-40AE-B4C6-C98DA3205C09}" type="datetimeFigureOut">
               <a:rPr lang="en-US" smtClean="0"/>
               <a:pPr/>
-              <a:t>4/17/2015</a:t>
+              <a:t>4/18/2015</a:t>
             </a:fld>
             <a:endParaRPr lang="en-US"/>
           </a:p>
@@ -1890,7 +1890,7 @@
             <a:fld id="{1D8BD707-D9CF-40AE-B4C6-C98DA3205C09}" type="datetimeFigureOut">
               <a:rPr lang="en-US" smtClean="0"/>
               <a:pPr/>
-              <a:t>4/17/2015</a:t>
+              <a:t>4/18/2015</a:t>
             </a:fld>
             <a:endParaRPr lang="en-US"/>
           </a:p>
@@ -1982,7 +1982,7 @@
             <a:fld id="{1D8BD707-D9CF-40AE-B4C6-C98DA3205C09}" type="datetimeFigureOut">
               <a:rPr lang="en-US" smtClean="0"/>
               <a:pPr/>
-              <a:t>4/17/2015</a:t>
+              <a:t>4/18/2015</a:t>
             </a:fld>
             <a:endParaRPr lang="en-US"/>
           </a:p>
@@ -2256,7 +2256,7 @@
             <a:fld id="{1D8BD707-D9CF-40AE-B4C6-C98DA3205C09}" type="datetimeFigureOut">
               <a:rPr lang="en-US" smtClean="0"/>
               <a:pPr/>
-              <a:t>4/17/2015</a:t>
+              <a:t>4/18/2015</a:t>
             </a:fld>
             <a:endParaRPr lang="en-US"/>
           </a:p>
@@ -2506,7 +2506,7 @@
             <a:fld id="{1D8BD707-D9CF-40AE-B4C6-C98DA3205C09}" type="datetimeFigureOut">
               <a:rPr lang="en-US" smtClean="0"/>
               <a:pPr/>
-              <a:t>4/17/2015</a:t>
+              <a:t>4/18/2015</a:t>
             </a:fld>
             <a:endParaRPr lang="en-US"/>
           </a:p>
@@ -2716,7 +2716,7 @@
             <a:fld id="{1D8BD707-D9CF-40AE-B4C6-C98DA3205C09}" type="datetimeFigureOut">
               <a:rPr lang="en-US" smtClean="0"/>
               <a:pPr/>
-              <a:t>4/17/2015</a:t>
+              <a:t>4/18/2015</a:t>
             </a:fld>
             <a:endParaRPr lang="en-US"/>
           </a:p>
@@ -4073,16 +4073,11 @@
               <a:rPr lang="en-US" dirty="0" smtClean="0"/>
               <a:t>We can use “predict” to get the line for our model, but it is good to know that we can do </a:t>
             </a:r>
-            <a:endParaRPr lang="en-US" dirty="0" smtClean="0"/>
-          </a:p>
-          <a:p>
-            <a:r>
-              <a:rPr lang="en-US" dirty="0" smtClean="0"/>
-              <a:t>i</a:t>
-            </a:r>
-            <a:r>
-              <a:rPr lang="en-US" dirty="0" smtClean="0"/>
-              <a:t>t ourselves…</a:t>
+          </a:p>
+          <a:p>
+            <a:r>
+              <a:rPr lang="en-US" dirty="0" smtClean="0"/>
+              <a:t>it ourselves…</a:t>
             </a:r>
             <a:endParaRPr lang="en-US" dirty="0"/>
           </a:p>
@@ -7733,36 +7728,6 @@
           </a:ln>
         </p:spPr>
       </p:pic>
-      <p:sp>
-        <p:nvSpPr>
-          <p:cNvPr id="7" name="TextBox 6"/>
-          <p:cNvSpPr txBox="1"/>
-          <p:nvPr/>
-        </p:nvSpPr>
-        <p:spPr>
-          <a:xfrm>
-            <a:off x="4572000" y="685800"/>
-            <a:ext cx="2133600" cy="646331"/>
-          </a:xfrm>
-          <a:prstGeom prst="rect">
-            <a:avLst/>
-          </a:prstGeom>
-          <a:noFill/>
-        </p:spPr>
-        <p:txBody>
-          <a:bodyPr wrap="square" rtlCol="0">
-            <a:spAutoFit/>
-          </a:bodyPr>
-          <a:lstStyle/>
-          <a:p>
-            <a:r>
-              <a:rPr lang="en-US" dirty="0" smtClean="0"/>
-              <a:t>Binomial distribution with n = 1</a:t>
-            </a:r>
-            <a:endParaRPr lang="en-US" dirty="0"/>
-          </a:p>
-        </p:txBody>
-      </p:sp>
       <p:pic>
         <p:nvPicPr>
           <p:cNvPr id="6147" name="Picture 3"/>
@@ -7821,6 +7786,78 @@
               <a:rPr lang="en-US" dirty="0" smtClean="0"/>
               <a:t>Find the parameters to maximize this and we are good to go….</a:t>
             </a:r>
+            <a:endParaRPr lang="en-US" dirty="0"/>
+          </a:p>
+        </p:txBody>
+      </p:sp>
+      <p:sp>
+        <p:nvSpPr>
+          <p:cNvPr id="8" name="TextBox 7"/>
+          <p:cNvSpPr txBox="1"/>
+          <p:nvPr/>
+        </p:nvSpPr>
+        <p:spPr>
+          <a:xfrm>
+            <a:off x="4572000" y="457200"/>
+            <a:ext cx="4572000" cy="1200329"/>
+          </a:xfrm>
+          <a:prstGeom prst="rect">
+            <a:avLst/>
+          </a:prstGeom>
+          <a:noFill/>
+        </p:spPr>
+        <p:txBody>
+          <a:bodyPr wrap="square" rtlCol="0">
+            <a:spAutoFit/>
+          </a:bodyPr>
+          <a:lstStyle/>
+          <a:p>
+            <a:r>
+              <a:rPr lang="en-US" dirty="0" smtClean="0"/>
+              <a:t>Binomial distribution with n = 1</a:t>
+            </a:r>
+          </a:p>
+          <a:p>
+            <a:r>
+              <a:rPr lang="en-US" dirty="0" smtClean="0"/>
+              <a:t>Yi is 1 or 0 </a:t>
+            </a:r>
+          </a:p>
+          <a:p>
+            <a:r>
+              <a:rPr lang="en-US" dirty="0" smtClean="0"/>
+              <a:t>This is </a:t>
+            </a:r>
+            <a:r>
+              <a:rPr lang="en-US" dirty="0" smtClean="0">
+                <a:sym typeface="Symbol"/>
+              </a:rPr>
+              <a:t></a:t>
+            </a:r>
+            <a:r>
+              <a:rPr lang="en-US" dirty="0" smtClean="0"/>
+              <a:t> if a head </a:t>
+            </a:r>
+            <a:r>
+              <a:rPr lang="en-US" dirty="0" smtClean="0"/>
+              <a:t>(1-</a:t>
+            </a:r>
+            <a:r>
+              <a:rPr lang="en-US" dirty="0" smtClean="0">
+                <a:sym typeface="Symbol"/>
+              </a:rPr>
+              <a:t> </a:t>
+            </a:r>
+            <a:r>
+              <a:rPr lang="en-US" dirty="0" smtClean="0"/>
+              <a:t>) </a:t>
+            </a:r>
+            <a:r>
+              <a:rPr lang="en-US" dirty="0" smtClean="0"/>
+              <a:t>if a tail</a:t>
+            </a:r>
+          </a:p>
+          <a:p>
             <a:endParaRPr lang="en-US" dirty="0"/>
           </a:p>
         </p:txBody>
@@ -9482,7 +9519,7 @@
         <p:spPr>
           <a:xfrm>
             <a:off x="4191000" y="3429000"/>
-            <a:ext cx="3102131" cy="646331"/>
+            <a:ext cx="4195187" cy="646331"/>
           </a:xfrm>
           <a:prstGeom prst="rect">
             <a:avLst/>
@@ -9497,7 +9534,15 @@
           <a:p>
             <a:r>
               <a:rPr lang="en-US" dirty="0" smtClean="0"/>
-              <a:t>The mean is a function of our </a:t>
+              <a:t>The </a:t>
+            </a:r>
+            <a:r>
+              <a:rPr lang="en-US" dirty="0" smtClean="0"/>
+              <a:t>model value mean is </a:t>
+            </a:r>
+            <a:r>
+              <a:rPr lang="en-US" dirty="0" smtClean="0"/>
+              <a:t>a function of our </a:t>
             </a:r>
           </a:p>
           <a:p>
@@ -9518,7 +9563,7 @@
         <p:spPr>
           <a:xfrm>
             <a:off x="1676400" y="4572000"/>
-            <a:ext cx="4973926" cy="646331"/>
+            <a:ext cx="5623142" cy="646331"/>
           </a:xfrm>
           <a:prstGeom prst="rect">
             <a:avLst/>
@@ -9539,7 +9584,15 @@
           <a:p>
             <a:r>
               <a:rPr lang="en-US" dirty="0" smtClean="0"/>
-              <a:t>The exponential term ensures only positive means!</a:t>
+              <a:t>The exponential term ensures only positive </a:t>
+            </a:r>
+            <a:r>
+              <a:rPr lang="en-US" dirty="0" smtClean="0"/>
+              <a:t>model means</a:t>
+            </a:r>
+            <a:r>
+              <a:rPr lang="en-US" dirty="0" smtClean="0"/>
+              <a:t>!</a:t>
             </a:r>
           </a:p>
         </p:txBody>
@@ -9874,8 +9927,8 @@
         </p:nvSpPr>
         <p:spPr>
           <a:xfrm>
-            <a:off x="5486400" y="2249269"/>
-            <a:ext cx="2938625" cy="646331"/>
+            <a:off x="5410200" y="2249269"/>
+            <a:ext cx="3587842" cy="646331"/>
           </a:xfrm>
           <a:prstGeom prst="rect">
             <a:avLst/>
@@ -9890,7 +9943,15 @@
           <a:p>
             <a:r>
               <a:rPr lang="en-US" dirty="0" smtClean="0"/>
-              <a:t>The mean is a function of our</a:t>
+              <a:t>The </a:t>
+            </a:r>
+            <a:r>
+              <a:rPr lang="en-US" dirty="0" smtClean="0"/>
+              <a:t>model mean </a:t>
+            </a:r>
+            <a:r>
+              <a:rPr lang="en-US" dirty="0" smtClean="0"/>
+              <a:t>is a function of our</a:t>
             </a:r>
           </a:p>
           <a:p>

</xml_diff>

<commit_message>
small changes to font for lecture 21
</commit_message>
<xml_diff>
--- a/classes/stats2015/Lecture21.pptx
+++ b/classes/stats2015/Lecture21.pptx
@@ -7832,24 +7832,34 @@
               <a:rPr lang="en-US" dirty="0" smtClean="0">
                 <a:sym typeface="Symbol"/>
               </a:rPr>
-              <a:t></a:t>
-            </a:r>
-            <a:r>
-              <a:rPr lang="en-US" dirty="0" smtClean="0"/>
-              <a:t> if a head </a:t>
-            </a:r>
-            <a:r>
-              <a:rPr lang="en-US" dirty="0" smtClean="0"/>
-              <a:t>(1-</a:t>
-            </a:r>
-            <a:r>
-              <a:rPr lang="en-US" dirty="0" smtClean="0">
+              <a:t></a:t>
+            </a:r>
+            <a:r>
+              <a:rPr lang="en-US" dirty="0" smtClean="0"/>
+              <a:t> </a:t>
+            </a:r>
+            <a:r>
+              <a:rPr lang="en-US" dirty="0" smtClean="0"/>
+              <a:t>if a head (</a:t>
+            </a:r>
+            <a:r>
+              <a:rPr lang="en-US" smtClean="0"/>
+              <a:t>1-</a:t>
+            </a:r>
+            <a:r>
+              <a:rPr lang="en-US" smtClean="0">
                 <a:sym typeface="Symbol"/>
               </a:rPr>
-              <a:t> </a:t>
-            </a:r>
-            <a:r>
-              <a:rPr lang="en-US" dirty="0" smtClean="0"/>
+              <a:t> </a:t>
+            </a:r>
+            <a:r>
+              <a:rPr lang="en-US" smtClean="0">
+                <a:sym typeface="Symbol"/>
+              </a:rPr>
+              <a:t></a:t>
+            </a:r>
+            <a:r>
+              <a:rPr lang="en-US" smtClean="0"/>
               <a:t>) </a:t>
             </a:r>
             <a:r>
@@ -9534,15 +9544,7 @@
           <a:p>
             <a:r>
               <a:rPr lang="en-US" dirty="0" smtClean="0"/>
-              <a:t>The </a:t>
-            </a:r>
-            <a:r>
-              <a:rPr lang="en-US" dirty="0" smtClean="0"/>
-              <a:t>model value mean is </a:t>
-            </a:r>
-            <a:r>
-              <a:rPr lang="en-US" dirty="0" smtClean="0"/>
-              <a:t>a function of our </a:t>
+              <a:t>The model value mean is a function of our </a:t>
             </a:r>
           </a:p>
           <a:p>
@@ -9584,15 +9586,7 @@
           <a:p>
             <a:r>
               <a:rPr lang="en-US" dirty="0" smtClean="0"/>
-              <a:t>The exponential term ensures only positive </a:t>
-            </a:r>
-            <a:r>
-              <a:rPr lang="en-US" dirty="0" smtClean="0"/>
-              <a:t>model means</a:t>
-            </a:r>
-            <a:r>
-              <a:rPr lang="en-US" dirty="0" smtClean="0"/>
-              <a:t>!</a:t>
+              <a:t>The exponential term ensures only positive model means!</a:t>
             </a:r>
           </a:p>
         </p:txBody>
@@ -9943,15 +9937,7 @@
           <a:p>
             <a:r>
               <a:rPr lang="en-US" dirty="0" smtClean="0"/>
-              <a:t>The </a:t>
-            </a:r>
-            <a:r>
-              <a:rPr lang="en-US" dirty="0" smtClean="0"/>
-              <a:t>model mean </a:t>
-            </a:r>
-            <a:r>
-              <a:rPr lang="en-US" dirty="0" smtClean="0"/>
-              <a:t>is a function of our</a:t>
+              <a:t>The model mean is a function of our</a:t>
             </a:r>
           </a:p>
           <a:p>

</xml_diff>